<commit_message>
fix: OIDC Workflow w/ OneLogin
</commit_message>
<xml_diff>
--- a/docs/img/nginx-oidc-flow.pptx
+++ b/docs/img/nginx-oidc-flow.pptx
@@ -259,7 +259,7 @@
           <a:p>
             <a:fld id="{FD36D0CE-793F-FB41-AD4F-0C45D94A4FBD}" type="datetimeFigureOut">
               <a:rPr lang="en-US" smtClean="0"/>
-              <a:t>9/21/22</a:t>
+              <a:t>10/4/22</a:t>
             </a:fld>
             <a:endParaRPr lang="en-US"/>
           </a:p>
@@ -457,7 +457,7 @@
           <a:p>
             <a:fld id="{FD36D0CE-793F-FB41-AD4F-0C45D94A4FBD}" type="datetimeFigureOut">
               <a:rPr lang="en-US" smtClean="0"/>
-              <a:t>9/21/22</a:t>
+              <a:t>10/4/22</a:t>
             </a:fld>
             <a:endParaRPr lang="en-US"/>
           </a:p>
@@ -665,7 +665,7 @@
           <a:p>
             <a:fld id="{FD36D0CE-793F-FB41-AD4F-0C45D94A4FBD}" type="datetimeFigureOut">
               <a:rPr lang="en-US" smtClean="0"/>
-              <a:t>9/21/22</a:t>
+              <a:t>10/4/22</a:t>
             </a:fld>
             <a:endParaRPr lang="en-US"/>
           </a:p>
@@ -863,7 +863,7 @@
           <a:p>
             <a:fld id="{FD36D0CE-793F-FB41-AD4F-0C45D94A4FBD}" type="datetimeFigureOut">
               <a:rPr lang="en-US" smtClean="0"/>
-              <a:t>9/21/22</a:t>
+              <a:t>10/4/22</a:t>
             </a:fld>
             <a:endParaRPr lang="en-US"/>
           </a:p>
@@ -1138,7 +1138,7 @@
           <a:p>
             <a:fld id="{FD36D0CE-793F-FB41-AD4F-0C45D94A4FBD}" type="datetimeFigureOut">
               <a:rPr lang="en-US" smtClean="0"/>
-              <a:t>9/21/22</a:t>
+              <a:t>10/4/22</a:t>
             </a:fld>
             <a:endParaRPr lang="en-US"/>
           </a:p>
@@ -1403,7 +1403,7 @@
           <a:p>
             <a:fld id="{FD36D0CE-793F-FB41-AD4F-0C45D94A4FBD}" type="datetimeFigureOut">
               <a:rPr lang="en-US" smtClean="0"/>
-              <a:t>9/21/22</a:t>
+              <a:t>10/4/22</a:t>
             </a:fld>
             <a:endParaRPr lang="en-US"/>
           </a:p>
@@ -1815,7 +1815,7 @@
           <a:p>
             <a:fld id="{FD36D0CE-793F-FB41-AD4F-0C45D94A4FBD}" type="datetimeFigureOut">
               <a:rPr lang="en-US" smtClean="0"/>
-              <a:t>9/21/22</a:t>
+              <a:t>10/4/22</a:t>
             </a:fld>
             <a:endParaRPr lang="en-US"/>
           </a:p>
@@ -1956,7 +1956,7 @@
           <a:p>
             <a:fld id="{FD36D0CE-793F-FB41-AD4F-0C45D94A4FBD}" type="datetimeFigureOut">
               <a:rPr lang="en-US" smtClean="0"/>
-              <a:t>9/21/22</a:t>
+              <a:t>10/4/22</a:t>
             </a:fld>
             <a:endParaRPr lang="en-US"/>
           </a:p>
@@ -2069,7 +2069,7 @@
           <a:p>
             <a:fld id="{FD36D0CE-793F-FB41-AD4F-0C45D94A4FBD}" type="datetimeFigureOut">
               <a:rPr lang="en-US" smtClean="0"/>
-              <a:t>9/21/22</a:t>
+              <a:t>10/4/22</a:t>
             </a:fld>
             <a:endParaRPr lang="en-US"/>
           </a:p>
@@ -2380,7 +2380,7 @@
           <a:p>
             <a:fld id="{FD36D0CE-793F-FB41-AD4F-0C45D94A4FBD}" type="datetimeFigureOut">
               <a:rPr lang="en-US" smtClean="0"/>
-              <a:t>9/21/22</a:t>
+              <a:t>10/4/22</a:t>
             </a:fld>
             <a:endParaRPr lang="en-US"/>
           </a:p>
@@ -2668,7 +2668,7 @@
           <a:p>
             <a:fld id="{FD36D0CE-793F-FB41-AD4F-0C45D94A4FBD}" type="datetimeFigureOut">
               <a:rPr lang="en-US" smtClean="0"/>
-              <a:t>9/21/22</a:t>
+              <a:t>10/4/22</a:t>
             </a:fld>
             <a:endParaRPr lang="en-US"/>
           </a:p>
@@ -2909,7 +2909,7 @@
           <a:p>
             <a:fld id="{FD36D0CE-793F-FB41-AD4F-0C45D94A4FBD}" type="datetimeFigureOut">
               <a:rPr lang="en-US" smtClean="0"/>
-              <a:t>9/21/22</a:t>
+              <a:t>10/4/22</a:t>
             </a:fld>
             <a:endParaRPr lang="en-US"/>
           </a:p>
@@ -6011,49 +6011,32 @@
       </p:sp>
       <p:pic>
         <p:nvPicPr>
-          <p:cNvPr id="3" name="Picture 2" descr="Okta Identity Management Review | PCMag">
-            <a:extLst>
-              <a:ext uri="{FF2B5EF4-FFF2-40B4-BE49-F238E27FC236}">
-                <a16:creationId xmlns:a16="http://schemas.microsoft.com/office/drawing/2014/main" id="{21E41C5C-BD37-49A7-9EEC-DC6DB522F138}"/>
+          <p:cNvPr id="54" name="Picture 53" descr="A picture containing company name&#10;&#10;Description automatically generated">
+            <a:extLst>
+              <a:ext uri="{FF2B5EF4-FFF2-40B4-BE49-F238E27FC236}">
+                <a16:creationId xmlns:a16="http://schemas.microsoft.com/office/drawing/2014/main" id="{B22553FC-88A1-CA7C-0268-0B17A5E25EBC}"/>
               </a:ext>
             </a:extLst>
           </p:cNvPr>
           <p:cNvPicPr>
-            <a:picLocks noChangeAspect="1" noChangeArrowheads="1"/>
+            <a:picLocks noChangeAspect="1"/>
           </p:cNvPicPr>
           <p:nvPr/>
         </p:nvPicPr>
         <p:blipFill>
-          <a:blip r:embed="rId9">
-            <a:extLst>
-              <a:ext uri="{28A0092B-C50C-407E-A947-70E740481C1C}">
-                <a14:useLocalDpi xmlns:a14="http://schemas.microsoft.com/office/drawing/2010/main" val="0"/>
-              </a:ext>
-            </a:extLst>
-          </a:blip>
-          <a:srcRect/>
+          <a:blip r:embed="rId9"/>
           <a:stretch>
             <a:fillRect/>
           </a:stretch>
         </p:blipFill>
-        <p:spPr bwMode="auto">
-          <a:xfrm>
-            <a:off x="7436566" y="1797800"/>
-            <a:ext cx="901718" cy="506651"/>
+        <p:spPr>
+          <a:xfrm>
+            <a:off x="7322553" y="1848410"/>
+            <a:ext cx="1116173" cy="421337"/>
           </a:xfrm>
           <a:prstGeom prst="rect">
             <a:avLst/>
           </a:prstGeom>
-          <a:noFill/>
-          <a:extLst>
-            <a:ext uri="{909E8E84-426E-40DD-AFC4-6F175D3DCCD1}">
-              <a14:hiddenFill xmlns:a14="http://schemas.microsoft.com/office/drawing/2010/main">
-                <a:solidFill>
-                  <a:srgbClr val="FFFFFF"/>
-                </a:solidFill>
-              </a14:hiddenFill>
-            </a:ext>
-          </a:extLst>
         </p:spPr>
       </p:pic>
     </p:spTree>

</xml_diff>